<commit_message>
- Adicionado logo do Matlab na apresentação - Corrigido alguns erros de portugês nos slides de escopo
</commit_message>
<xml_diff>
--- a/02_Apresentações_Documentação/Projeto_Inicial.pptx
+++ b/02_Apresentações_Documentação/Projeto_Inicial.pptx
@@ -217,7 +217,7 @@
             <a:fld id="{9AD0BAD0-1087-43A9-B1A9-7A9D8A84A638}" type="datetimeFigureOut">
               <a:rPr lang="de-DE" smtClean="0"/>
               <a:pPr/>
-              <a:t>27.08.2014</a:t>
+              <a:t>30.08.2014</a:t>
             </a:fld>
             <a:endParaRPr lang="de-DE"/>
           </a:p>
@@ -384,7 +384,7 @@
             <a:fld id="{F8C568D1-65C2-4CDE-9B8E-4F04E333B056}" type="datetimeFigureOut">
               <a:rPr lang="en-US" smtClean="0"/>
               <a:pPr/>
-              <a:t>8/27/2014</a:t>
+              <a:t>8/30/2014</a:t>
             </a:fld>
             <a:endParaRPr lang="en-US"/>
           </a:p>
@@ -11044,52 +11044,6 @@
       </p:sp>
       <p:sp>
         <p:nvSpPr>
-          <p:cNvPr id="9" name="Textplatzhalter 8"/>
-          <p:cNvSpPr>
-            <a:spLocks noGrp="1"/>
-          </p:cNvSpPr>
-          <p:nvPr>
-            <p:ph type="body" sz="quarter" idx="10"/>
-          </p:nvPr>
-        </p:nvSpPr>
-        <p:spPr/>
-        <p:txBody>
-          <a:bodyPr/>
-          <a:lstStyle/>
-          <a:p>
-            <a:r>
-              <a:rPr lang="en-US" noProof="0" smtClean="0"/>
-              <a:t>www.continental-corporation.com</a:t>
-            </a:r>
-            <a:endParaRPr lang="en-US" noProof="0"/>
-          </a:p>
-        </p:txBody>
-      </p:sp>
-      <p:sp>
-        <p:nvSpPr>
-          <p:cNvPr id="10" name="Textplatzhalter 9"/>
-          <p:cNvSpPr>
-            <a:spLocks noGrp="1"/>
-          </p:cNvSpPr>
-          <p:nvPr>
-            <p:ph type="body" sz="quarter" idx="11"/>
-          </p:nvPr>
-        </p:nvSpPr>
-        <p:spPr/>
-        <p:txBody>
-          <a:bodyPr/>
-          <a:lstStyle/>
-          <a:p>
-            <a:r>
-              <a:rPr lang="en-US" noProof="0" smtClean="0"/>
-              <a:t>Division Naming</a:t>
-            </a:r>
-            <a:endParaRPr lang="en-US" noProof="0"/>
-          </a:p>
-        </p:txBody>
-      </p:sp>
-      <p:sp>
-        <p:nvSpPr>
           <p:cNvPr id="8" name="Textplatzhalter 7"/>
           <p:cNvSpPr>
             <a:spLocks noGrp="1"/>
@@ -11115,6 +11069,29 @@
           <a:lstStyle/>
           <a:p>
             <a:endParaRPr lang="de-DE" dirty="0"/>
+          </a:p>
+        </p:txBody>
+      </p:sp>
+      <p:sp>
+        <p:nvSpPr>
+          <p:cNvPr id="4" name="Espaço Reservado para Texto 3"/>
+          <p:cNvSpPr>
+            <a:spLocks noGrp="1"/>
+          </p:cNvSpPr>
+          <p:nvPr>
+            <p:ph type="body" sz="quarter" idx="10"/>
+          </p:nvPr>
+        </p:nvSpPr>
+        <p:spPr/>
+        <p:txBody>
+          <a:bodyPr/>
+          <a:lstStyle/>
+          <a:p>
+            <a:r>
+              <a:rPr lang="pt-BR" dirty="0" smtClean="0"/>
+              <a:t>Centro Universitário da FEI</a:t>
+            </a:r>
+            <a:endParaRPr lang="pt-BR" dirty="0"/>
           </a:p>
         </p:txBody>
       </p:sp>
@@ -11227,7 +11204,7 @@
             <a:fld id="{2B2B0548-AFAD-4ECF-8F1C-59D119517961}" type="datetime3">
               <a:rPr lang="en-US" smtClean="0"/>
               <a:pPr/>
-              <a:t>27 August 2014</a:t>
+              <a:t>30 August 2014</a:t>
             </a:fld>
             <a:endParaRPr lang="en-US"/>
           </a:p>
@@ -11391,7 +11368,7 @@
             <a:fld id="{091A6FF4-B217-4F24-BE19-92AADE2417CA}" type="datetime3">
               <a:rPr lang="en-US" smtClean="0"/>
               <a:pPr/>
-              <a:t>27 August 2014</a:t>
+              <a:t>30 August 2014</a:t>
             </a:fld>
             <a:endParaRPr lang="en-US"/>
           </a:p>
@@ -12006,7 +11983,7 @@
             <a:fld id="{DEEB114E-D360-40B9-8089-62278DF3F109}" type="datetime3">
               <a:rPr lang="en-US" smtClean="0"/>
               <a:pPr/>
-              <a:t>27 August 2014</a:t>
+              <a:t>30 August 2014</a:t>
             </a:fld>
             <a:endParaRPr lang="en-US"/>
           </a:p>
@@ -12733,7 +12710,7 @@
             <a:fld id="{B82B24CA-CE37-477F-AF43-107A4FF6330F}" type="datetime3">
               <a:rPr lang="en-US" smtClean="0"/>
               <a:pPr/>
-              <a:t>27 August 2014</a:t>
+              <a:t>30 August 2014</a:t>
             </a:fld>
             <a:endParaRPr lang="en-US"/>
           </a:p>
@@ -13390,7 +13367,7 @@
             <a:fld id="{6F9A7525-F98F-4791-8304-F61ECDD9E2E5}" type="datetime3">
               <a:rPr lang="en-US" noProof="0" smtClean="0"/>
               <a:pPr/>
-              <a:t>27 August 2014</a:t>
+              <a:t>30 August 2014</a:t>
             </a:fld>
             <a:endParaRPr lang="en-US" noProof="0"/>
           </a:p>
@@ -13615,7 +13592,7 @@
             <a:fld id="{7F9C1E94-159A-4641-9F0D-50D37F25F1C9}" type="datetime3">
               <a:rPr lang="en-US" noProof="0" smtClean="0"/>
               <a:pPr/>
-              <a:t>27 August 2014</a:t>
+              <a:t>30 August 2014</a:t>
             </a:fld>
             <a:endParaRPr lang="en-US" noProof="0"/>
           </a:p>
@@ -13844,7 +13821,7 @@
             <a:fld id="{0A589DDA-7BD9-4A72-AD2D-371161E9BBC9}" type="datetime3">
               <a:rPr lang="en-US" noProof="0" smtClean="0"/>
               <a:pPr/>
-              <a:t>27 August 2014</a:t>
+              <a:t>30 August 2014</a:t>
             </a:fld>
             <a:endParaRPr lang="en-US" noProof="0"/>
           </a:p>
@@ -14071,7 +14048,7 @@
             <a:fld id="{0ED8CB57-B10A-45FD-A2C8-673592ABBDFB}" type="datetime3">
               <a:rPr lang="en-US" noProof="0" smtClean="0"/>
               <a:pPr/>
-              <a:t>27 August 2014</a:t>
+              <a:t>30 August 2014</a:t>
             </a:fld>
             <a:endParaRPr lang="en-US" noProof="0"/>
           </a:p>
@@ -14379,7 +14356,7 @@
             <a:fld id="{059CA66F-68AE-48F5-94F0-45BED671E83A}" type="datetime3">
               <a:rPr lang="en-US" noProof="0" smtClean="0"/>
               <a:pPr/>
-              <a:t>27 August 2014</a:t>
+              <a:t>30 August 2014</a:t>
             </a:fld>
             <a:endParaRPr lang="en-US" noProof="0"/>
           </a:p>
@@ -14667,7 +14644,7 @@
             <a:fld id="{DEEB114E-D360-40B9-8089-62278DF3F109}" type="datetime3">
               <a:rPr lang="en-US" smtClean="0"/>
               <a:pPr/>
-              <a:t>27 August 2014</a:t>
+              <a:t>30 August 2014</a:t>
             </a:fld>
             <a:endParaRPr lang="en-US"/>
           </a:p>
@@ -15284,14 +15261,6 @@
               </a:rPr>
               <a:t>Hardware</a:t>
             </a:r>
-            <a:endParaRPr lang="en-US" sz="1400" dirty="0" smtClean="0">
-              <a:solidFill>
-                <a:schemeClr val="bg2">
-                  <a:lumMod val="10000"/>
-                </a:schemeClr>
-              </a:solidFill>
-              <a:latin typeface="Arial"/>
-            </a:endParaRPr>
           </a:p>
         </p:txBody>
       </p:sp>
@@ -15392,14 +15361,6 @@
               </a:rPr>
               <a:t>Software</a:t>
             </a:r>
-            <a:endParaRPr lang="en-US" sz="1400" dirty="0" smtClean="0">
-              <a:solidFill>
-                <a:schemeClr val="bg2">
-                  <a:lumMod val="10000"/>
-                </a:schemeClr>
-              </a:solidFill>
-              <a:latin typeface="Arial"/>
-            </a:endParaRPr>
           </a:p>
         </p:txBody>
       </p:sp>
@@ -15586,7 +15547,7 @@
             <a:fld id="{7F9C1E94-159A-4641-9F0D-50D37F25F1C9}" type="datetime3">
               <a:rPr lang="en-US" noProof="0" smtClean="0"/>
               <a:pPr/>
-              <a:t>27 August 2014</a:t>
+              <a:t>30 August 2014</a:t>
             </a:fld>
             <a:endParaRPr lang="en-US" noProof="0"/>
           </a:p>
@@ -15916,12 +15877,13 @@
             </a:r>
             <a:r>
               <a:rPr lang="en-US" sz="1800" dirty="0" err="1" smtClean="0"/>
-              <a:t>Robótico</a:t>
+              <a:t>Robóticos</a:t>
             </a:r>
             <a:r>
               <a:rPr lang="en-US" sz="1800" dirty="0" smtClean="0"/>
               <a:t>;</a:t>
             </a:r>
+            <a:endParaRPr lang="en-US" sz="1800" dirty="0" smtClean="0"/>
           </a:p>
           <a:p>
             <a:pPr marL="285750" indent="-285750">
@@ -16211,7 +16173,7 @@
             <a:fld id="{7F9C1E94-159A-4641-9F0D-50D37F25F1C9}" type="datetime3">
               <a:rPr lang="en-US" noProof="0" smtClean="0"/>
               <a:pPr/>
-              <a:t>27 August 2014</a:t>
+              <a:t>30 August 2014</a:t>
             </a:fld>
             <a:endParaRPr lang="en-US" noProof="0"/>
           </a:p>
@@ -16525,11 +16487,7 @@
             </a:r>
             <a:r>
               <a:rPr lang="en-US" sz="1800" dirty="0" err="1" smtClean="0"/>
-              <a:t>utilizad</a:t>
-            </a:r>
-            <a:r>
-              <a:rPr lang="en-US" sz="1800" dirty="0" err="1" smtClean="0"/>
-              <a:t>o</a:t>
+              <a:t>utilizado</a:t>
             </a:r>
             <a:r>
               <a:rPr lang="en-US" sz="1800" dirty="0" smtClean="0"/>
@@ -16538,155 +16496,6 @@
             <a:r>
               <a:rPr lang="en-US" sz="1800" dirty="0" err="1" smtClean="0"/>
               <a:t>robótica</a:t>
-            </a:r>
-            <a:r>
-              <a:rPr lang="en-US" sz="1800" dirty="0" smtClean="0"/>
-              <a:t>;</a:t>
-            </a:r>
-            <a:endParaRPr lang="en-US" sz="1800" dirty="0" smtClean="0"/>
-          </a:p>
-          <a:p>
-            <a:pPr marL="285750" indent="-285750">
-              <a:buFont typeface="Arial" pitchFamily="34" charset="0"/>
-              <a:buChar char="•"/>
-            </a:pPr>
-            <a:r>
-              <a:rPr lang="en-US" sz="1800" dirty="0" smtClean="0"/>
-              <a:t>Ambos </a:t>
-            </a:r>
-            <a:r>
-              <a:rPr lang="en-US" sz="1800" dirty="0" err="1" smtClean="0"/>
-              <a:t>os</a:t>
-            </a:r>
-            <a:r>
-              <a:rPr lang="en-US" sz="1800" dirty="0" smtClean="0"/>
-              <a:t> </a:t>
-            </a:r>
-            <a:r>
-              <a:rPr lang="en-US" sz="1800" dirty="0" err="1" smtClean="0"/>
-              <a:t>braços</a:t>
-            </a:r>
-            <a:r>
-              <a:rPr lang="en-US" sz="1800" dirty="0" smtClean="0"/>
-              <a:t> </a:t>
-            </a:r>
-            <a:r>
-              <a:rPr lang="en-US" sz="1800" dirty="0" err="1" smtClean="0"/>
-              <a:t>possuirão</a:t>
-            </a:r>
-            <a:r>
-              <a:rPr lang="en-US" sz="1800" dirty="0" smtClean="0"/>
-              <a:t> </a:t>
-            </a:r>
-            <a:r>
-              <a:rPr lang="en-US" sz="1800" dirty="0" err="1" smtClean="0"/>
-              <a:t>mesmo</a:t>
-            </a:r>
-            <a:r>
-              <a:rPr lang="en-US" sz="1800" dirty="0" smtClean="0"/>
-              <a:t> </a:t>
-            </a:r>
-            <a:r>
-              <a:rPr lang="en-US" sz="1800" dirty="0" err="1" smtClean="0"/>
-              <a:t>formato</a:t>
-            </a:r>
-            <a:r>
-              <a:rPr lang="en-US" sz="1800" dirty="0" smtClean="0"/>
-              <a:t> do </a:t>
-            </a:r>
-            <a:r>
-              <a:rPr lang="en-US" sz="1800" dirty="0" err="1" smtClean="0"/>
-              <a:t>corpo</a:t>
-            </a:r>
-            <a:r>
-              <a:rPr lang="en-US" sz="1800" dirty="0" smtClean="0"/>
-              <a:t>, com 6 </a:t>
-            </a:r>
-            <a:r>
-              <a:rPr lang="en-US" sz="1800" dirty="0" err="1" smtClean="0"/>
-              <a:t>graus</a:t>
-            </a:r>
-            <a:r>
-              <a:rPr lang="en-US" sz="1800" dirty="0" smtClean="0"/>
-              <a:t> de </a:t>
-            </a:r>
-            <a:r>
-              <a:rPr lang="en-US" sz="1800" dirty="0" err="1" smtClean="0"/>
-              <a:t>liberdade</a:t>
-            </a:r>
-            <a:r>
-              <a:rPr lang="en-US" sz="1800" dirty="0" smtClean="0"/>
-              <a:t>;</a:t>
-            </a:r>
-          </a:p>
-          <a:p>
-            <a:pPr marL="285750" indent="-285750">
-              <a:buFont typeface="Arial" pitchFamily="34" charset="0"/>
-              <a:buChar char="•"/>
-            </a:pPr>
-            <a:r>
-              <a:rPr lang="en-US" sz="1800" dirty="0" smtClean="0"/>
-              <a:t>Um dos </a:t>
-            </a:r>
-            <a:r>
-              <a:rPr lang="en-US" sz="1800" dirty="0" err="1" smtClean="0"/>
-              <a:t>braços</a:t>
-            </a:r>
-            <a:r>
-              <a:rPr lang="en-US" sz="1800" dirty="0" smtClean="0"/>
-              <a:t> </a:t>
-            </a:r>
-            <a:r>
-              <a:rPr lang="en-US" sz="1800" dirty="0" err="1" smtClean="0"/>
-              <a:t>possui</a:t>
-            </a:r>
-            <a:r>
-              <a:rPr lang="en-US" sz="1800" dirty="0" smtClean="0"/>
-              <a:t> </a:t>
-            </a:r>
-            <a:r>
-              <a:rPr lang="en-US" sz="1800" dirty="0" err="1" smtClean="0"/>
-              <a:t>uma</a:t>
-            </a:r>
-            <a:r>
-              <a:rPr lang="en-US" sz="1800" dirty="0" smtClean="0"/>
-              <a:t> </a:t>
-            </a:r>
-            <a:r>
-              <a:rPr lang="en-US" sz="1800" dirty="0" err="1" smtClean="0"/>
-              <a:t>Garra</a:t>
-            </a:r>
-            <a:r>
-              <a:rPr lang="en-US" sz="1800" dirty="0" smtClean="0"/>
-              <a:t>, o outro um Joystick, </a:t>
-            </a:r>
-            <a:r>
-              <a:rPr lang="en-US" sz="1800" dirty="0" err="1" smtClean="0"/>
-              <a:t>acoplados</a:t>
-            </a:r>
-            <a:r>
-              <a:rPr lang="en-US" sz="1800" dirty="0" smtClean="0"/>
-              <a:t> </a:t>
-            </a:r>
-            <a:r>
-              <a:rPr lang="en-US" sz="1800" dirty="0" err="1" smtClean="0"/>
-              <a:t>nas</a:t>
-            </a:r>
-            <a:r>
-              <a:rPr lang="en-US" sz="1800" dirty="0" smtClean="0"/>
-              <a:t> </a:t>
-            </a:r>
-            <a:r>
-              <a:rPr lang="en-US" sz="1800" dirty="0" err="1" smtClean="0"/>
-              <a:t>extremidades</a:t>
-            </a:r>
-            <a:r>
-              <a:rPr lang="en-US" sz="1800" dirty="0" smtClean="0"/>
-              <a:t> dos </a:t>
-            </a:r>
-            <a:r>
-              <a:rPr lang="en-US" sz="1800" dirty="0" err="1" smtClean="0"/>
-              <a:t>braços</a:t>
             </a:r>
             <a:r>
               <a:rPr lang="en-US" sz="1800" dirty="0" smtClean="0"/>
@@ -16849,7 +16658,7 @@
             <a:fld id="{7F9C1E94-159A-4641-9F0D-50D37F25F1C9}" type="datetime3">
               <a:rPr lang="en-US" noProof="0" smtClean="0"/>
               <a:pPr/>
-              <a:t>27 August 2014</a:t>
+              <a:t>30 August 2014</a:t>
             </a:fld>
             <a:endParaRPr lang="en-US" noProof="0"/>
           </a:p>
@@ -16935,7 +16744,7 @@
         </p:blipFill>
         <p:spPr bwMode="auto">
           <a:xfrm>
-            <a:off x="6192192" y="2060848"/>
+            <a:off x="6192192" y="1247361"/>
             <a:ext cx="1016297" cy="1460279"/>
           </a:xfrm>
           <a:prstGeom prst="rect">
@@ -16976,7 +16785,7 @@
         </p:blipFill>
         <p:spPr bwMode="auto">
           <a:xfrm>
-            <a:off x="5876355" y="1461364"/>
+            <a:off x="5876355" y="647877"/>
             <a:ext cx="1647973" cy="353137"/>
           </a:xfrm>
           <a:prstGeom prst="rect">
@@ -17017,7 +16826,7 @@
         </p:blipFill>
         <p:spPr bwMode="auto">
           <a:xfrm>
-            <a:off x="6044593" y="3781842"/>
+            <a:off x="6044593" y="2968355"/>
             <a:ext cx="1311493" cy="1259033"/>
           </a:xfrm>
           <a:prstGeom prst="rect">
@@ -17276,6 +17085,47 @@
           </a:p>
         </p:txBody>
       </p:sp>
+      <p:pic>
+        <p:nvPicPr>
+          <p:cNvPr id="1026" name="Picture 2" descr="Z:\Users\Raphael\Desktop\TCC_git\02_Apresentações_Documentação\Imagens\physics_tools_matlab.jpg"/>
+          <p:cNvPicPr>
+            <a:picLocks noChangeAspect="1" noChangeArrowheads="1"/>
+          </p:cNvPicPr>
+          <p:nvPr/>
+        </p:nvPicPr>
+        <p:blipFill>
+          <a:blip r:embed="rId5">
+            <a:extLst>
+              <a:ext uri="{28A0092B-C50C-407E-A947-70E740481C1C}">
+                <a14:useLocalDpi xmlns:a14="http://schemas.microsoft.com/office/drawing/2010/main" val="0"/>
+              </a:ext>
+            </a:extLst>
+          </a:blip>
+          <a:srcRect/>
+          <a:stretch>
+            <a:fillRect/>
+          </a:stretch>
+        </p:blipFill>
+        <p:spPr bwMode="auto">
+          <a:xfrm>
+            <a:off x="6021199" y="4330710"/>
+            <a:ext cx="1159990" cy="1465454"/>
+          </a:xfrm>
+          <a:prstGeom prst="rect">
+            <a:avLst/>
+          </a:prstGeom>
+          <a:noFill/>
+          <a:extLst>
+            <a:ext uri="{909E8E84-426E-40DD-AFC4-6F175D3DCCD1}">
+              <a14:hiddenFill xmlns:a14="http://schemas.microsoft.com/office/drawing/2010/main">
+                <a:solidFill>
+                  <a:srgbClr val="FFFFFF"/>
+                </a:solidFill>
+              </a14:hiddenFill>
+            </a:ext>
+          </a:extLst>
+        </p:spPr>
+      </p:pic>
     </p:spTree>
     <p:extLst>
       <p:ext uri="{BB962C8B-B14F-4D97-AF65-F5344CB8AC3E}">
@@ -17332,8 +17182,24 @@
           <a:lstStyle/>
           <a:p>
             <a:r>
+              <a:rPr lang="en-US" dirty="0" err="1"/>
+              <a:t>p</a:t>
+            </a:r>
+            <a:r>
+              <a:rPr lang="en-US" noProof="0" dirty="0" err="1" smtClean="0"/>
+              <a:t>ela</a:t>
+            </a:r>
+            <a:r>
               <a:rPr lang="en-US" noProof="0" dirty="0" smtClean="0"/>
-              <a:t>for your attention!</a:t>
+              <a:t> </a:t>
+            </a:r>
+            <a:r>
+              <a:rPr lang="en-US" noProof="0" dirty="0" err="1" smtClean="0"/>
+              <a:t>atenção</a:t>
+            </a:r>
+            <a:r>
+              <a:rPr lang="en-US" noProof="0" dirty="0" smtClean="0"/>
+              <a:t>!</a:t>
             </a:r>
             <a:endParaRPr lang="en-US" noProof="0" dirty="0"/>
           </a:p>
@@ -17355,10 +17221,10 @@
           <a:lstStyle/>
           <a:p>
             <a:r>
-              <a:rPr lang="en-US" noProof="0" smtClean="0"/>
-              <a:t>Thank you</a:t>
-            </a:r>
-            <a:endParaRPr lang="en-US" noProof="0"/>
+              <a:rPr lang="en-US" noProof="0" dirty="0" smtClean="0"/>
+              <a:t>Obrigado</a:t>
+            </a:r>
+            <a:endParaRPr lang="en-US" noProof="0" dirty="0"/>
           </a:p>
         </p:txBody>
       </p:sp>
@@ -17385,7 +17251,7 @@
             <a:fld id="{D6E3E337-305E-4483-824B-4A86B40D6007}" type="datetime3">
               <a:rPr lang="en-US" smtClean="0"/>
               <a:pPr/>
-              <a:t>27 August 2014</a:t>
+              <a:t>30 August 2014</a:t>
             </a:fld>
             <a:endParaRPr lang="en-US"/>
           </a:p>
@@ -17974,7 +17840,7 @@
             <a:fld id="{7F9C1E94-159A-4641-9F0D-50D37F25F1C9}" type="datetime3">
               <a:rPr lang="en-US" noProof="0" smtClean="0"/>
               <a:pPr/>
-              <a:t>27 August 2014</a:t>
+              <a:t>30 August 2014</a:t>
             </a:fld>
             <a:endParaRPr lang="en-US" noProof="0"/>
           </a:p>
@@ -18304,7 +18170,7 @@
             <a:fld id="{25812634-C235-4B2A-B081-E818F1CD5EB1}" type="datetime3">
               <a:rPr lang="en-US" smtClean="0"/>
               <a:pPr/>
-              <a:t>27 August 2014</a:t>
+              <a:t>30 August 2014</a:t>
             </a:fld>
             <a:endParaRPr lang="en-US"/>
           </a:p>

</xml_diff>